<commit_message>
Many revisions (defining subconcepts of top-tier concepts), plus docs & images
</commit_message>
<xml_diff>
--- a/model/images/biotoolsrdf-images.pptx
+++ b/model/images/biotoolsrdf-images.pptx
@@ -6,6 +6,9 @@
   </p:sldMasterIdLst>
   <p:sldIdLst>
     <p:sldId id="256" r:id="rId2"/>
+    <p:sldId id="257" r:id="rId3"/>
+    <p:sldId id="258" r:id="rId4"/>
+    <p:sldId id="259" r:id="rId5"/>
   </p:sldIdLst>
   <p:sldSz cx="12192000" cy="6858000"/>
   <p:notesSz cx="6858000" cy="9144000"/>
@@ -104,6 +107,11 @@
       </a:defRPr>
     </a:lvl9pPr>
   </p:defaultTextStyle>
+  <p:extLst>
+    <p:ext uri="{EFAFB233-063F-42B5-8137-9DF3F51BA10A}">
+      <p15:sldGuideLst xmlns:p15="http://schemas.microsoft.com/office/powerpoint/2012/main"/>
+    </p:ext>
+  </p:extLst>
 </p:presentation>
 </file>
 
@@ -256,7 +264,7 @@
           <a:p>
             <a:fld id="{85F3EF6B-6253-4F7A-ADBB-CA38D9CC85F7}" type="datetimeFigureOut">
               <a:rPr lang="en-GB" smtClean="0"/>
-              <a:t>02/06/2020</a:t>
+              <a:t>03/06/2020</a:t>
             </a:fld>
             <a:endParaRPr lang="en-GB"/>
           </a:p>
@@ -456,7 +464,7 @@
           <a:p>
             <a:fld id="{85F3EF6B-6253-4F7A-ADBB-CA38D9CC85F7}" type="datetimeFigureOut">
               <a:rPr lang="en-GB" smtClean="0"/>
-              <a:t>02/06/2020</a:t>
+              <a:t>03/06/2020</a:t>
             </a:fld>
             <a:endParaRPr lang="en-GB"/>
           </a:p>
@@ -666,7 +674,7 @@
           <a:p>
             <a:fld id="{85F3EF6B-6253-4F7A-ADBB-CA38D9CC85F7}" type="datetimeFigureOut">
               <a:rPr lang="en-GB" smtClean="0"/>
-              <a:t>02/06/2020</a:t>
+              <a:t>03/06/2020</a:t>
             </a:fld>
             <a:endParaRPr lang="en-GB"/>
           </a:p>
@@ -866,7 +874,7 @@
           <a:p>
             <a:fld id="{85F3EF6B-6253-4F7A-ADBB-CA38D9CC85F7}" type="datetimeFigureOut">
               <a:rPr lang="en-GB" smtClean="0"/>
-              <a:t>02/06/2020</a:t>
+              <a:t>03/06/2020</a:t>
             </a:fld>
             <a:endParaRPr lang="en-GB"/>
           </a:p>
@@ -1142,7 +1150,7 @@
           <a:p>
             <a:fld id="{85F3EF6B-6253-4F7A-ADBB-CA38D9CC85F7}" type="datetimeFigureOut">
               <a:rPr lang="en-GB" smtClean="0"/>
-              <a:t>02/06/2020</a:t>
+              <a:t>03/06/2020</a:t>
             </a:fld>
             <a:endParaRPr lang="en-GB"/>
           </a:p>
@@ -1410,7 +1418,7 @@
           <a:p>
             <a:fld id="{85F3EF6B-6253-4F7A-ADBB-CA38D9CC85F7}" type="datetimeFigureOut">
               <a:rPr lang="en-GB" smtClean="0"/>
-              <a:t>02/06/2020</a:t>
+              <a:t>03/06/2020</a:t>
             </a:fld>
             <a:endParaRPr lang="en-GB"/>
           </a:p>
@@ -1825,7 +1833,7 @@
           <a:p>
             <a:fld id="{85F3EF6B-6253-4F7A-ADBB-CA38D9CC85F7}" type="datetimeFigureOut">
               <a:rPr lang="en-GB" smtClean="0"/>
-              <a:t>02/06/2020</a:t>
+              <a:t>03/06/2020</a:t>
             </a:fld>
             <a:endParaRPr lang="en-GB"/>
           </a:p>
@@ -1967,7 +1975,7 @@
           <a:p>
             <a:fld id="{85F3EF6B-6253-4F7A-ADBB-CA38D9CC85F7}" type="datetimeFigureOut">
               <a:rPr lang="en-GB" smtClean="0"/>
-              <a:t>02/06/2020</a:t>
+              <a:t>03/06/2020</a:t>
             </a:fld>
             <a:endParaRPr lang="en-GB"/>
           </a:p>
@@ -2080,7 +2088,7 @@
           <a:p>
             <a:fld id="{85F3EF6B-6253-4F7A-ADBB-CA38D9CC85F7}" type="datetimeFigureOut">
               <a:rPr lang="en-GB" smtClean="0"/>
-              <a:t>02/06/2020</a:t>
+              <a:t>03/06/2020</a:t>
             </a:fld>
             <a:endParaRPr lang="en-GB"/>
           </a:p>
@@ -2393,7 +2401,7 @@
           <a:p>
             <a:fld id="{85F3EF6B-6253-4F7A-ADBB-CA38D9CC85F7}" type="datetimeFigureOut">
               <a:rPr lang="en-GB" smtClean="0"/>
-              <a:t>02/06/2020</a:t>
+              <a:t>03/06/2020</a:t>
             </a:fld>
             <a:endParaRPr lang="en-GB"/>
           </a:p>
@@ -2682,7 +2690,7 @@
           <a:p>
             <a:fld id="{85F3EF6B-6253-4F7A-ADBB-CA38D9CC85F7}" type="datetimeFigureOut">
               <a:rPr lang="en-GB" smtClean="0"/>
-              <a:t>02/06/2020</a:t>
+              <a:t>03/06/2020</a:t>
             </a:fld>
             <a:endParaRPr lang="en-GB"/>
           </a:p>
@@ -2925,7 +2933,7 @@
           <a:p>
             <a:fld id="{85F3EF6B-6253-4F7A-ADBB-CA38D9CC85F7}" type="datetimeFigureOut">
               <a:rPr lang="en-GB" smtClean="0"/>
-              <a:t>02/06/2020</a:t>
+              <a:t>03/06/2020</a:t>
             </a:fld>
             <a:endParaRPr lang="en-GB"/>
           </a:p>
@@ -3385,6 +3393,186 @@
 </p:sld>
 </file>
 
+<file path=ppt/slides/slide2.xml><?xml version="1.0" encoding="utf-8"?>
+<p:sld xmlns:a="http://schemas.openxmlformats.org/drawingml/2006/main" xmlns:r="http://schemas.openxmlformats.org/officeDocument/2006/relationships" xmlns:p="http://schemas.openxmlformats.org/presentationml/2006/main">
+  <p:cSld>
+    <p:spTree>
+      <p:nvGrpSpPr>
+        <p:cNvPr id="1" name=""/>
+        <p:cNvGrpSpPr/>
+        <p:nvPr/>
+      </p:nvGrpSpPr>
+      <p:grpSpPr>
+        <a:xfrm>
+          <a:off x="0" y="0"/>
+          <a:ext cx="0" cy="0"/>
+          <a:chOff x="0" y="0"/>
+          <a:chExt cx="0" cy="0"/>
+        </a:xfrm>
+      </p:grpSpPr>
+      <p:pic>
+        <p:nvPicPr>
+          <p:cNvPr id="7" name="Picture 6">
+            <a:extLst>
+              <a:ext uri="{FF2B5EF4-FFF2-40B4-BE49-F238E27FC236}">
+                <a16:creationId xmlns:a16="http://schemas.microsoft.com/office/drawing/2014/main" id="{57946B6C-5662-4448-9376-7A64EBF05626}"/>
+              </a:ext>
+            </a:extLst>
+          </p:cNvPr>
+          <p:cNvPicPr>
+            <a:picLocks noChangeAspect="1"/>
+          </p:cNvPicPr>
+          <p:nvPr/>
+        </p:nvPicPr>
+        <p:blipFill>
+          <a:blip r:embed="rId2"/>
+          <a:stretch>
+            <a:fillRect/>
+          </a:stretch>
+        </p:blipFill>
+        <p:spPr>
+          <a:xfrm>
+            <a:off x="3289852" y="0"/>
+            <a:ext cx="5612296" cy="6858000"/>
+          </a:xfrm>
+          <a:prstGeom prst="rect">
+            <a:avLst/>
+          </a:prstGeom>
+        </p:spPr>
+      </p:pic>
+    </p:spTree>
+    <p:extLst>
+      <p:ext uri="{BB962C8B-B14F-4D97-AF65-F5344CB8AC3E}">
+        <p14:creationId xmlns:p14="http://schemas.microsoft.com/office/powerpoint/2010/main" val="466733623"/>
+      </p:ext>
+    </p:extLst>
+  </p:cSld>
+  <p:clrMapOvr>
+    <a:masterClrMapping/>
+  </p:clrMapOvr>
+</p:sld>
+</file>
+
+<file path=ppt/slides/slide3.xml><?xml version="1.0" encoding="utf-8"?>
+<p:sld xmlns:a="http://schemas.openxmlformats.org/drawingml/2006/main" xmlns:r="http://schemas.openxmlformats.org/officeDocument/2006/relationships" xmlns:p="http://schemas.openxmlformats.org/presentationml/2006/main">
+  <p:cSld>
+    <p:spTree>
+      <p:nvGrpSpPr>
+        <p:cNvPr id="1" name=""/>
+        <p:cNvGrpSpPr/>
+        <p:nvPr/>
+      </p:nvGrpSpPr>
+      <p:grpSpPr>
+        <a:xfrm>
+          <a:off x="0" y="0"/>
+          <a:ext cx="0" cy="0"/>
+          <a:chOff x="0" y="0"/>
+          <a:chExt cx="0" cy="0"/>
+        </a:xfrm>
+      </p:grpSpPr>
+      <p:pic>
+        <p:nvPicPr>
+          <p:cNvPr id="4" name="Picture 3">
+            <a:extLst>
+              <a:ext uri="{FF2B5EF4-FFF2-40B4-BE49-F238E27FC236}">
+                <a16:creationId xmlns:a16="http://schemas.microsoft.com/office/drawing/2014/main" id="{301AE8F8-9C8B-4FAA-AAEA-8D9F342E9830}"/>
+              </a:ext>
+            </a:extLst>
+          </p:cNvPr>
+          <p:cNvPicPr>
+            <a:picLocks noChangeAspect="1"/>
+          </p:cNvPicPr>
+          <p:nvPr/>
+        </p:nvPicPr>
+        <p:blipFill>
+          <a:blip r:embed="rId2"/>
+          <a:stretch>
+            <a:fillRect/>
+          </a:stretch>
+        </p:blipFill>
+        <p:spPr>
+          <a:xfrm>
+            <a:off x="1643743" y="1744435"/>
+            <a:ext cx="8904514" cy="3369129"/>
+          </a:xfrm>
+          <a:prstGeom prst="rect">
+            <a:avLst/>
+          </a:prstGeom>
+        </p:spPr>
+      </p:pic>
+    </p:spTree>
+    <p:extLst>
+      <p:ext uri="{BB962C8B-B14F-4D97-AF65-F5344CB8AC3E}">
+        <p14:creationId xmlns:p14="http://schemas.microsoft.com/office/powerpoint/2010/main" val="3505239699"/>
+      </p:ext>
+    </p:extLst>
+  </p:cSld>
+  <p:clrMapOvr>
+    <a:masterClrMapping/>
+  </p:clrMapOvr>
+</p:sld>
+</file>
+
+<file path=ppt/slides/slide4.xml><?xml version="1.0" encoding="utf-8"?>
+<p:sld xmlns:a="http://schemas.openxmlformats.org/drawingml/2006/main" xmlns:r="http://schemas.openxmlformats.org/officeDocument/2006/relationships" xmlns:p="http://schemas.openxmlformats.org/presentationml/2006/main">
+  <p:cSld>
+    <p:spTree>
+      <p:nvGrpSpPr>
+        <p:cNvPr id="1" name=""/>
+        <p:cNvGrpSpPr/>
+        <p:nvPr/>
+      </p:nvGrpSpPr>
+      <p:grpSpPr>
+        <a:xfrm>
+          <a:off x="0" y="0"/>
+          <a:ext cx="0" cy="0"/>
+          <a:chOff x="0" y="0"/>
+          <a:chExt cx="0" cy="0"/>
+        </a:xfrm>
+      </p:grpSpPr>
+      <p:pic>
+        <p:nvPicPr>
+          <p:cNvPr id="4" name="Picture 3">
+            <a:extLst>
+              <a:ext uri="{FF2B5EF4-FFF2-40B4-BE49-F238E27FC236}">
+                <a16:creationId xmlns:a16="http://schemas.microsoft.com/office/drawing/2014/main" id="{2BC283AB-0C52-49A7-86AF-49B8A1999E51}"/>
+              </a:ext>
+            </a:extLst>
+          </p:cNvPr>
+          <p:cNvPicPr>
+            <a:picLocks noChangeAspect="1"/>
+          </p:cNvPicPr>
+          <p:nvPr/>
+        </p:nvPicPr>
+        <p:blipFill>
+          <a:blip r:embed="rId2"/>
+          <a:stretch>
+            <a:fillRect/>
+          </a:stretch>
+        </p:blipFill>
+        <p:spPr>
+          <a:xfrm>
+            <a:off x="2585357" y="1036864"/>
+            <a:ext cx="7021286" cy="4784271"/>
+          </a:xfrm>
+          <a:prstGeom prst="rect">
+            <a:avLst/>
+          </a:prstGeom>
+        </p:spPr>
+      </p:pic>
+    </p:spTree>
+    <p:extLst>
+      <p:ext uri="{BB962C8B-B14F-4D97-AF65-F5344CB8AC3E}">
+        <p14:creationId xmlns:p14="http://schemas.microsoft.com/office/powerpoint/2010/main" val="1452276078"/>
+      </p:ext>
+    </p:extLst>
+  </p:cSld>
+  <p:clrMapOvr>
+    <a:masterClrMapping/>
+  </p:clrMapOvr>
+</p:sld>
+</file>
+
 <file path=ppt/theme/theme1.xml><?xml version="1.0" encoding="utf-8"?>
 <a:theme xmlns:a="http://schemas.openxmlformats.org/drawingml/2006/main" name="Office Theme">
   <a:themeElements>

</xml_diff>

<commit_message>
Major revision - 1st draft of OWL file nearly complete
</commit_message>
<xml_diff>
--- a/model/images/biotoolsrdf-images.pptx
+++ b/model/images/biotoolsrdf-images.pptx
@@ -9,6 +9,8 @@
     <p:sldId id="257" r:id="rId3"/>
     <p:sldId id="258" r:id="rId4"/>
     <p:sldId id="259" r:id="rId5"/>
+    <p:sldId id="260" r:id="rId6"/>
+    <p:sldId id="261" r:id="rId7"/>
   </p:sldIdLst>
   <p:sldSz cx="12192000" cy="6858000"/>
   <p:notesSz cx="6858000" cy="9144000"/>
@@ -264,7 +266,7 @@
           <a:p>
             <a:fld id="{85F3EF6B-6253-4F7A-ADBB-CA38D9CC85F7}" type="datetimeFigureOut">
               <a:rPr lang="en-GB" smtClean="0"/>
-              <a:t>03/06/2020</a:t>
+              <a:t>04/06/2020</a:t>
             </a:fld>
             <a:endParaRPr lang="en-GB"/>
           </a:p>
@@ -464,7 +466,7 @@
           <a:p>
             <a:fld id="{85F3EF6B-6253-4F7A-ADBB-CA38D9CC85F7}" type="datetimeFigureOut">
               <a:rPr lang="en-GB" smtClean="0"/>
-              <a:t>03/06/2020</a:t>
+              <a:t>04/06/2020</a:t>
             </a:fld>
             <a:endParaRPr lang="en-GB"/>
           </a:p>
@@ -674,7 +676,7 @@
           <a:p>
             <a:fld id="{85F3EF6B-6253-4F7A-ADBB-CA38D9CC85F7}" type="datetimeFigureOut">
               <a:rPr lang="en-GB" smtClean="0"/>
-              <a:t>03/06/2020</a:t>
+              <a:t>04/06/2020</a:t>
             </a:fld>
             <a:endParaRPr lang="en-GB"/>
           </a:p>
@@ -874,7 +876,7 @@
           <a:p>
             <a:fld id="{85F3EF6B-6253-4F7A-ADBB-CA38D9CC85F7}" type="datetimeFigureOut">
               <a:rPr lang="en-GB" smtClean="0"/>
-              <a:t>03/06/2020</a:t>
+              <a:t>04/06/2020</a:t>
             </a:fld>
             <a:endParaRPr lang="en-GB"/>
           </a:p>
@@ -1150,7 +1152,7 @@
           <a:p>
             <a:fld id="{85F3EF6B-6253-4F7A-ADBB-CA38D9CC85F7}" type="datetimeFigureOut">
               <a:rPr lang="en-GB" smtClean="0"/>
-              <a:t>03/06/2020</a:t>
+              <a:t>04/06/2020</a:t>
             </a:fld>
             <a:endParaRPr lang="en-GB"/>
           </a:p>
@@ -1418,7 +1420,7 @@
           <a:p>
             <a:fld id="{85F3EF6B-6253-4F7A-ADBB-CA38D9CC85F7}" type="datetimeFigureOut">
               <a:rPr lang="en-GB" smtClean="0"/>
-              <a:t>03/06/2020</a:t>
+              <a:t>04/06/2020</a:t>
             </a:fld>
             <a:endParaRPr lang="en-GB"/>
           </a:p>
@@ -1833,7 +1835,7 @@
           <a:p>
             <a:fld id="{85F3EF6B-6253-4F7A-ADBB-CA38D9CC85F7}" type="datetimeFigureOut">
               <a:rPr lang="en-GB" smtClean="0"/>
-              <a:t>03/06/2020</a:t>
+              <a:t>04/06/2020</a:t>
             </a:fld>
             <a:endParaRPr lang="en-GB"/>
           </a:p>
@@ -1975,7 +1977,7 @@
           <a:p>
             <a:fld id="{85F3EF6B-6253-4F7A-ADBB-CA38D9CC85F7}" type="datetimeFigureOut">
               <a:rPr lang="en-GB" smtClean="0"/>
-              <a:t>03/06/2020</a:t>
+              <a:t>04/06/2020</a:t>
             </a:fld>
             <a:endParaRPr lang="en-GB"/>
           </a:p>
@@ -2088,7 +2090,7 @@
           <a:p>
             <a:fld id="{85F3EF6B-6253-4F7A-ADBB-CA38D9CC85F7}" type="datetimeFigureOut">
               <a:rPr lang="en-GB" smtClean="0"/>
-              <a:t>03/06/2020</a:t>
+              <a:t>04/06/2020</a:t>
             </a:fld>
             <a:endParaRPr lang="en-GB"/>
           </a:p>
@@ -2401,7 +2403,7 @@
           <a:p>
             <a:fld id="{85F3EF6B-6253-4F7A-ADBB-CA38D9CC85F7}" type="datetimeFigureOut">
               <a:rPr lang="en-GB" smtClean="0"/>
-              <a:t>03/06/2020</a:t>
+              <a:t>04/06/2020</a:t>
             </a:fld>
             <a:endParaRPr lang="en-GB"/>
           </a:p>
@@ -2690,7 +2692,7 @@
           <a:p>
             <a:fld id="{85F3EF6B-6253-4F7A-ADBB-CA38D9CC85F7}" type="datetimeFigureOut">
               <a:rPr lang="en-GB" smtClean="0"/>
-              <a:t>03/06/2020</a:t>
+              <a:t>04/06/2020</a:t>
             </a:fld>
             <a:endParaRPr lang="en-GB"/>
           </a:p>
@@ -2933,7 +2935,7 @@
           <a:p>
             <a:fld id="{85F3EF6B-6253-4F7A-ADBB-CA38D9CC85F7}" type="datetimeFigureOut">
               <a:rPr lang="en-GB" smtClean="0"/>
-              <a:t>03/06/2020</a:t>
+              <a:t>04/06/2020</a:t>
             </a:fld>
             <a:endParaRPr lang="en-GB"/>
           </a:p>
@@ -3352,10 +3354,10 @@
       </p:grpSpPr>
       <p:pic>
         <p:nvPicPr>
-          <p:cNvPr id="4" name="Picture 3">
-            <a:extLst>
-              <a:ext uri="{FF2B5EF4-FFF2-40B4-BE49-F238E27FC236}">
-                <a16:creationId xmlns:a16="http://schemas.microsoft.com/office/drawing/2014/main" id="{7DDECE4F-5F58-470E-B06F-A88337B069FA}"/>
+          <p:cNvPr id="2" name="Picture 1">
+            <a:extLst>
+              <a:ext uri="{FF2B5EF4-FFF2-40B4-BE49-F238E27FC236}">
+                <a16:creationId xmlns:a16="http://schemas.microsoft.com/office/drawing/2014/main" id="{C4EB1193-7BD4-4849-8E6E-ACF2CFCAA4EA}"/>
               </a:ext>
             </a:extLst>
           </p:cNvPr>
@@ -3372,8 +3374,8 @@
         </p:blipFill>
         <p:spPr>
           <a:xfrm>
-            <a:off x="3480707" y="1807028"/>
-            <a:ext cx="5230586" cy="3243943"/>
+            <a:off x="3477985" y="1801585"/>
+            <a:ext cx="5236029" cy="3254829"/>
           </a:xfrm>
           <a:prstGeom prst="rect">
             <a:avLst/>
@@ -3412,10 +3414,10 @@
       </p:grpSpPr>
       <p:pic>
         <p:nvPicPr>
-          <p:cNvPr id="7" name="Picture 6">
-            <a:extLst>
-              <a:ext uri="{FF2B5EF4-FFF2-40B4-BE49-F238E27FC236}">
-                <a16:creationId xmlns:a16="http://schemas.microsoft.com/office/drawing/2014/main" id="{57946B6C-5662-4448-9376-7A64EBF05626}"/>
+          <p:cNvPr id="2" name="Picture 1">
+            <a:extLst>
+              <a:ext uri="{FF2B5EF4-FFF2-40B4-BE49-F238E27FC236}">
+                <a16:creationId xmlns:a16="http://schemas.microsoft.com/office/drawing/2014/main" id="{8D9B55CA-9CEC-4D03-ABBF-CF719C9C6334}"/>
               </a:ext>
             </a:extLst>
           </p:cNvPr>
@@ -3432,8 +3434,8 @@
         </p:blipFill>
         <p:spPr>
           <a:xfrm>
-            <a:off x="3289852" y="0"/>
-            <a:ext cx="5612296" cy="6858000"/>
+            <a:off x="3296782" y="0"/>
+            <a:ext cx="5598435" cy="6858000"/>
           </a:xfrm>
           <a:prstGeom prst="rect">
             <a:avLst/>
@@ -3472,10 +3474,10 @@
       </p:grpSpPr>
       <p:pic>
         <p:nvPicPr>
-          <p:cNvPr id="4" name="Picture 3">
-            <a:extLst>
-              <a:ext uri="{FF2B5EF4-FFF2-40B4-BE49-F238E27FC236}">
-                <a16:creationId xmlns:a16="http://schemas.microsoft.com/office/drawing/2014/main" id="{301AE8F8-9C8B-4FAA-AAEA-8D9F342E9830}"/>
+          <p:cNvPr id="2" name="Picture 1">
+            <a:extLst>
+              <a:ext uri="{FF2B5EF4-FFF2-40B4-BE49-F238E27FC236}">
+                <a16:creationId xmlns:a16="http://schemas.microsoft.com/office/drawing/2014/main" id="{F44498E8-0DB1-40E5-BFE6-7DB02FFF412D}"/>
               </a:ext>
             </a:extLst>
           </p:cNvPr>
@@ -3532,10 +3534,10 @@
       </p:grpSpPr>
       <p:pic>
         <p:nvPicPr>
-          <p:cNvPr id="4" name="Picture 3">
-            <a:extLst>
-              <a:ext uri="{FF2B5EF4-FFF2-40B4-BE49-F238E27FC236}">
-                <a16:creationId xmlns:a16="http://schemas.microsoft.com/office/drawing/2014/main" id="{2BC283AB-0C52-49A7-86AF-49B8A1999E51}"/>
+          <p:cNvPr id="2" name="Picture 1">
+            <a:extLst>
+              <a:ext uri="{FF2B5EF4-FFF2-40B4-BE49-F238E27FC236}">
+                <a16:creationId xmlns:a16="http://schemas.microsoft.com/office/drawing/2014/main" id="{AC01ED91-75C3-482B-8B88-5B33981FBACC}"/>
               </a:ext>
             </a:extLst>
           </p:cNvPr>
@@ -3564,6 +3566,126 @@
     <p:extLst>
       <p:ext uri="{BB962C8B-B14F-4D97-AF65-F5344CB8AC3E}">
         <p14:creationId xmlns:p14="http://schemas.microsoft.com/office/powerpoint/2010/main" val="1452276078"/>
+      </p:ext>
+    </p:extLst>
+  </p:cSld>
+  <p:clrMapOvr>
+    <a:masterClrMapping/>
+  </p:clrMapOvr>
+</p:sld>
+</file>
+
+<file path=ppt/slides/slide5.xml><?xml version="1.0" encoding="utf-8"?>
+<p:sld xmlns:a="http://schemas.openxmlformats.org/drawingml/2006/main" xmlns:r="http://schemas.openxmlformats.org/officeDocument/2006/relationships" xmlns:p="http://schemas.openxmlformats.org/presentationml/2006/main">
+  <p:cSld>
+    <p:spTree>
+      <p:nvGrpSpPr>
+        <p:cNvPr id="1" name=""/>
+        <p:cNvGrpSpPr/>
+        <p:nvPr/>
+      </p:nvGrpSpPr>
+      <p:grpSpPr>
+        <a:xfrm>
+          <a:off x="0" y="0"/>
+          <a:ext cx="0" cy="0"/>
+          <a:chOff x="0" y="0"/>
+          <a:chExt cx="0" cy="0"/>
+        </a:xfrm>
+      </p:grpSpPr>
+      <p:pic>
+        <p:nvPicPr>
+          <p:cNvPr id="4" name="Picture 3">
+            <a:extLst>
+              <a:ext uri="{FF2B5EF4-FFF2-40B4-BE49-F238E27FC236}">
+                <a16:creationId xmlns:a16="http://schemas.microsoft.com/office/drawing/2014/main" id="{CEDC3396-B980-4C0E-8B04-3EA8A31E0D30}"/>
+              </a:ext>
+            </a:extLst>
+          </p:cNvPr>
+          <p:cNvPicPr>
+            <a:picLocks noChangeAspect="1"/>
+          </p:cNvPicPr>
+          <p:nvPr/>
+        </p:nvPicPr>
+        <p:blipFill>
+          <a:blip r:embed="rId2"/>
+          <a:stretch>
+            <a:fillRect/>
+          </a:stretch>
+        </p:blipFill>
+        <p:spPr>
+          <a:xfrm>
+            <a:off x="2590800" y="1045028"/>
+            <a:ext cx="7010400" cy="4767943"/>
+          </a:xfrm>
+          <a:prstGeom prst="rect">
+            <a:avLst/>
+          </a:prstGeom>
+        </p:spPr>
+      </p:pic>
+    </p:spTree>
+    <p:extLst>
+      <p:ext uri="{BB962C8B-B14F-4D97-AF65-F5344CB8AC3E}">
+        <p14:creationId xmlns:p14="http://schemas.microsoft.com/office/powerpoint/2010/main" val="3580238802"/>
+      </p:ext>
+    </p:extLst>
+  </p:cSld>
+  <p:clrMapOvr>
+    <a:masterClrMapping/>
+  </p:clrMapOvr>
+</p:sld>
+</file>
+
+<file path=ppt/slides/slide6.xml><?xml version="1.0" encoding="utf-8"?>
+<p:sld xmlns:a="http://schemas.openxmlformats.org/drawingml/2006/main" xmlns:r="http://schemas.openxmlformats.org/officeDocument/2006/relationships" xmlns:p="http://schemas.openxmlformats.org/presentationml/2006/main">
+  <p:cSld>
+    <p:spTree>
+      <p:nvGrpSpPr>
+        <p:cNvPr id="1" name=""/>
+        <p:cNvGrpSpPr/>
+        <p:nvPr/>
+      </p:nvGrpSpPr>
+      <p:grpSpPr>
+        <a:xfrm>
+          <a:off x="0" y="0"/>
+          <a:ext cx="0" cy="0"/>
+          <a:chOff x="0" y="0"/>
+          <a:chExt cx="0" cy="0"/>
+        </a:xfrm>
+      </p:grpSpPr>
+      <p:pic>
+        <p:nvPicPr>
+          <p:cNvPr id="4" name="Picture 3">
+            <a:extLst>
+              <a:ext uri="{FF2B5EF4-FFF2-40B4-BE49-F238E27FC236}">
+                <a16:creationId xmlns:a16="http://schemas.microsoft.com/office/drawing/2014/main" id="{617D5BC4-874B-4382-BFCD-F0AA1929D029}"/>
+              </a:ext>
+            </a:extLst>
+          </p:cNvPr>
+          <p:cNvPicPr>
+            <a:picLocks noChangeAspect="1"/>
+          </p:cNvPicPr>
+          <p:nvPr/>
+        </p:nvPicPr>
+        <p:blipFill>
+          <a:blip r:embed="rId2"/>
+          <a:stretch>
+            <a:fillRect/>
+          </a:stretch>
+        </p:blipFill>
+        <p:spPr>
+          <a:xfrm>
+            <a:off x="2541814" y="1679121"/>
+            <a:ext cx="7108371" cy="3499757"/>
+          </a:xfrm>
+          <a:prstGeom prst="rect">
+            <a:avLst/>
+          </a:prstGeom>
+        </p:spPr>
+      </p:pic>
+    </p:spTree>
+    <p:extLst>
+      <p:ext uri="{BB962C8B-B14F-4D97-AF65-F5344CB8AC3E}">
+        <p14:creationId xmlns:p14="http://schemas.microsoft.com/office/powerpoint/2010/main" val="1101215406"/>
       </p:ext>
     </p:extLst>
   </p:cSld>

</xml_diff>